<commit_message>
display the card data
</commit_message>
<xml_diff>
--- a/NFC Technology workshop.pptx
+++ b/NFC Technology workshop.pptx
@@ -18270,8 +18270,8 @@
         </p:nvSpPr>
         <p:spPr>
           <a:xfrm>
-            <a:off x="573405" y="4230237"/>
-            <a:ext cx="7747101" cy="872836"/>
+            <a:off x="678815" y="4171950"/>
+            <a:ext cx="7747000" cy="873125"/>
           </a:xfrm>
           <a:prstGeom prst="roundRect">
             <a:avLst/>

</xml_diff>